<commit_message>
added menu to main page
</commit_message>
<xml_diff>
--- a/Presentation1.pptx
+++ b/Presentation1.pptx
@@ -109,6 +109,11 @@
       </a:defRPr>
     </a:lvl9pPr>
   </p:defaultTextStyle>
+  <p:extLst>
+    <p:ext uri="{EFAFB233-063F-42B5-8137-9DF3F51BA10A}">
+      <p15:sldGuideLst xmlns:p15="http://schemas.microsoft.com/office/powerpoint/2012/main"/>
+    </p:ext>
+  </p:extLst>
 </p:presentation>
 </file>
 
@@ -5603,10 +5608,9 @@
           </a:p>
           <a:p>
             <a:r>
-              <a:rPr lang="fi-FI" dirty="0" err="1"/>
-              <a:t>Ohjelmointikiet</a:t>
-            </a:r>
-            <a:endParaRPr lang="fi-FI" dirty="0"/>
+              <a:rPr lang="fi-FI" dirty="0"/>
+              <a:t>Ohjelmointikielet</a:t>
+            </a:r>
           </a:p>
           <a:p>
             <a:pPr lvl="1"/>
@@ -5646,7 +5650,23 @@
             </a:r>
             <a:r>
               <a:rPr lang="fi-FI" dirty="0"/>
-              <a:t> CLI</a:t>
+              <a:t> CLI (</a:t>
+            </a:r>
+            <a:r>
+              <a:rPr lang="fi-FI" dirty="0" err="1"/>
+              <a:t>Command-line</a:t>
+            </a:r>
+            <a:r>
+              <a:rPr lang="fi-FI" dirty="0"/>
+              <a:t> </a:t>
+            </a:r>
+            <a:r>
+              <a:rPr lang="fi-FI" dirty="0" err="1"/>
+              <a:t>interface</a:t>
+            </a:r>
+            <a:r>
+              <a:rPr lang="fi-FI" dirty="0"/>
+              <a:t>)</a:t>
             </a:r>
           </a:p>
           <a:p>
@@ -5681,6 +5701,39 @@
           </a:p>
         </p:txBody>
       </p:sp>
+      <p:pic>
+        <p:nvPicPr>
+          <p:cNvPr id="8" name="Kuva 7">
+            <a:extLst>
+              <a:ext uri="{FF2B5EF4-FFF2-40B4-BE49-F238E27FC236}">
+                <a16:creationId xmlns:a16="http://schemas.microsoft.com/office/drawing/2014/main" id="{D84C9A57-7099-48B9-A3C0-B3E3B5805AAE}"/>
+              </a:ext>
+            </a:extLst>
+          </p:cNvPr>
+          <p:cNvPicPr>
+            <a:picLocks noChangeAspect="1"/>
+          </p:cNvPicPr>
+          <p:nvPr/>
+        </p:nvPicPr>
+        <p:blipFill>
+          <a:blip r:embed="rId3"/>
+          <a:stretch>
+            <a:fillRect/>
+          </a:stretch>
+        </p:blipFill>
+        <p:spPr>
+          <a:xfrm>
+            <a:off x="6661512" y="2301288"/>
+            <a:ext cx="5271253" cy="2965958"/>
+          </a:xfrm>
+          <a:prstGeom prst="rect">
+            <a:avLst/>
+          </a:prstGeom>
+          <a:solidFill>
+            <a:schemeClr val="accent1"/>
+          </a:solidFill>
+        </p:spPr>
+      </p:pic>
     </p:spTree>
     <p:extLst>
       <p:ext uri="{BB962C8B-B14F-4D97-AF65-F5344CB8AC3E}">
@@ -5759,7 +5812,7 @@
         </p:nvSpPr>
         <p:spPr>
           <a:xfrm>
-            <a:off x="684212" y="794221"/>
+            <a:off x="683253" y="458394"/>
             <a:ext cx="8534400" cy="1507067"/>
           </a:xfrm>
         </p:spPr>
@@ -5793,7 +5846,7 @@
         </p:nvSpPr>
         <p:spPr>
           <a:xfrm>
-            <a:off x="684212" y="1821180"/>
+            <a:off x="683253" y="1625237"/>
             <a:ext cx="10137668" cy="5036820"/>
           </a:xfrm>
         </p:spPr>
@@ -5833,6 +5886,28 @@
             </a:r>
           </a:p>
           <a:p>
+            <a:pPr lvl="4"/>
+            <a:r>
+              <a:rPr lang="fi-FI" dirty="0"/>
+              <a:t>Androidmanifest.xml</a:t>
+            </a:r>
+          </a:p>
+          <a:p>
+            <a:pPr lvl="4"/>
+            <a:r>
+              <a:rPr lang="fi-FI" dirty="0" err="1"/>
+              <a:t>App.gradle</a:t>
+            </a:r>
+            <a:endParaRPr lang="fi-FI" dirty="0"/>
+          </a:p>
+          <a:p>
+            <a:pPr lvl="4"/>
+            <a:r>
+              <a:rPr lang="fi-FI" dirty="0"/>
+              <a:t>...</a:t>
+            </a:r>
+          </a:p>
+          <a:p>
             <a:pPr lvl="3"/>
             <a:r>
               <a:rPr lang="fi-FI" dirty="0"/>
@@ -5889,6 +5964,36 @@
           </a:p>
         </p:txBody>
       </p:sp>
+      <p:pic>
+        <p:nvPicPr>
+          <p:cNvPr id="2" name="Kuva 1">
+            <a:extLst>
+              <a:ext uri="{FF2B5EF4-FFF2-40B4-BE49-F238E27FC236}">
+                <a16:creationId xmlns:a16="http://schemas.microsoft.com/office/drawing/2014/main" id="{F580021F-2605-4C68-A79C-693353DABE74}"/>
+              </a:ext>
+            </a:extLst>
+          </p:cNvPr>
+          <p:cNvPicPr>
+            <a:picLocks noChangeAspect="1"/>
+          </p:cNvPicPr>
+          <p:nvPr/>
+        </p:nvPicPr>
+        <p:blipFill>
+          <a:blip r:embed="rId3"/>
+          <a:stretch>
+            <a:fillRect/>
+          </a:stretch>
+        </p:blipFill>
+        <p:spPr>
+          <a:xfrm>
+            <a:off x="7254789" y="1770979"/>
+            <a:ext cx="1738885" cy="4891078"/>
+          </a:xfrm>
+          <a:prstGeom prst="rect">
+            <a:avLst/>
+          </a:prstGeom>
+        </p:spPr>
+      </p:pic>
     </p:spTree>
     <p:extLst>
       <p:ext uri="{BB962C8B-B14F-4D97-AF65-F5344CB8AC3E}">
@@ -6130,7 +6235,7 @@
         </p:nvSpPr>
         <p:spPr>
           <a:xfrm>
-            <a:off x="684212" y="794221"/>
+            <a:off x="684212" y="513370"/>
             <a:ext cx="8534400" cy="1507067"/>
           </a:xfrm>
         </p:spPr>
@@ -6164,7 +6269,7 @@
         </p:nvSpPr>
         <p:spPr>
           <a:xfrm>
-            <a:off x="684212" y="1821180"/>
+            <a:off x="684212" y="1357448"/>
             <a:ext cx="10137668" cy="4869180"/>
           </a:xfrm>
         </p:spPr>
@@ -6287,6 +6392,36 @@
           </a:p>
         </p:txBody>
       </p:sp>
+      <p:pic>
+        <p:nvPicPr>
+          <p:cNvPr id="4" name="Kuva 3">
+            <a:extLst>
+              <a:ext uri="{FF2B5EF4-FFF2-40B4-BE49-F238E27FC236}">
+                <a16:creationId xmlns:a16="http://schemas.microsoft.com/office/drawing/2014/main" id="{4A4A35AC-8125-4DE1-8AD5-95C3E067D7AD}"/>
+              </a:ext>
+            </a:extLst>
+          </p:cNvPr>
+          <p:cNvPicPr>
+            <a:picLocks noChangeAspect="1"/>
+          </p:cNvPicPr>
+          <p:nvPr/>
+        </p:nvPicPr>
+        <p:blipFill>
+          <a:blip r:embed="rId3"/>
+          <a:stretch>
+            <a:fillRect/>
+          </a:stretch>
+        </p:blipFill>
+        <p:spPr>
+          <a:xfrm>
+            <a:off x="3958701" y="5303326"/>
+            <a:ext cx="5259911" cy="1319179"/>
+          </a:xfrm>
+          <a:prstGeom prst="rect">
+            <a:avLst/>
+          </a:prstGeom>
+        </p:spPr>
+      </p:pic>
     </p:spTree>
     <p:extLst>
       <p:ext uri="{BB962C8B-B14F-4D97-AF65-F5344CB8AC3E}">
@@ -6365,7 +6500,7 @@
         </p:nvSpPr>
         <p:spPr>
           <a:xfrm>
-            <a:off x="1309052" y="1256452"/>
+            <a:off x="1335178" y="720874"/>
             <a:ext cx="8534400" cy="1507067"/>
           </a:xfrm>
         </p:spPr>
@@ -6400,7 +6535,7 @@
         </p:nvSpPr>
         <p:spPr>
           <a:xfrm>
-            <a:off x="722840" y="3116897"/>
+            <a:off x="722840" y="2796426"/>
             <a:ext cx="4649787" cy="576262"/>
           </a:xfrm>
         </p:spPr>
@@ -6434,7 +6569,7 @@
         </p:nvSpPr>
         <p:spPr>
           <a:xfrm>
-            <a:off x="578907" y="3693159"/>
+            <a:off x="722840" y="3372688"/>
             <a:ext cx="4937655" cy="3030538"/>
           </a:xfrm>
         </p:spPr>
@@ -6488,7 +6623,7 @@
         </p:nvSpPr>
         <p:spPr>
           <a:xfrm>
-            <a:off x="5947039" y="3116897"/>
+            <a:off x="5947039" y="2693419"/>
             <a:ext cx="4665134" cy="576262"/>
           </a:xfrm>
         </p:spPr>
@@ -6522,7 +6657,7 @@
         </p:nvSpPr>
         <p:spPr>
           <a:xfrm>
-            <a:off x="5815012" y="3693159"/>
+            <a:off x="5815012" y="3287529"/>
             <a:ext cx="4929188" cy="3030538"/>
           </a:xfrm>
         </p:spPr>

</xml_diff>